<commit_message>
Added idioms for many major components
</commit_message>
<xml_diff>
--- a/_drafts/idiom-draft/diagram.pptx
+++ b/_drafts/idiom-draft/diagram.pptx
@@ -288,7 +288,7 @@
           <a:p>
             <a:fld id="{13F24B86-36D2-4655-BE2F-98B661AC85E1}" type="datetimeFigureOut">
               <a:rPr lang="en-US" smtClean="0"/>
-              <a:t>3/10/2014</a:t>
+              <a:t>3/19/2014</a:t>
             </a:fld>
             <a:endParaRPr lang="en-US"/>
           </a:p>
@@ -458,7 +458,7 @@
           <a:p>
             <a:fld id="{13F24B86-36D2-4655-BE2F-98B661AC85E1}" type="datetimeFigureOut">
               <a:rPr lang="en-US" smtClean="0"/>
-              <a:t>3/10/2014</a:t>
+              <a:t>3/19/2014</a:t>
             </a:fld>
             <a:endParaRPr lang="en-US"/>
           </a:p>
@@ -638,7 +638,7 @@
           <a:p>
             <a:fld id="{13F24B86-36D2-4655-BE2F-98B661AC85E1}" type="datetimeFigureOut">
               <a:rPr lang="en-US" smtClean="0"/>
-              <a:t>3/10/2014</a:t>
+              <a:t>3/19/2014</a:t>
             </a:fld>
             <a:endParaRPr lang="en-US"/>
           </a:p>
@@ -808,7 +808,7 @@
           <a:p>
             <a:fld id="{13F24B86-36D2-4655-BE2F-98B661AC85E1}" type="datetimeFigureOut">
               <a:rPr lang="en-US" smtClean="0"/>
-              <a:t>3/10/2014</a:t>
+              <a:t>3/19/2014</a:t>
             </a:fld>
             <a:endParaRPr lang="en-US"/>
           </a:p>
@@ -1054,7 +1054,7 @@
           <a:p>
             <a:fld id="{13F24B86-36D2-4655-BE2F-98B661AC85E1}" type="datetimeFigureOut">
               <a:rPr lang="en-US" smtClean="0"/>
-              <a:t>3/10/2014</a:t>
+              <a:t>3/19/2014</a:t>
             </a:fld>
             <a:endParaRPr lang="en-US"/>
           </a:p>
@@ -1342,7 +1342,7 @@
           <a:p>
             <a:fld id="{13F24B86-36D2-4655-BE2F-98B661AC85E1}" type="datetimeFigureOut">
               <a:rPr lang="en-US" smtClean="0"/>
-              <a:t>3/10/2014</a:t>
+              <a:t>3/19/2014</a:t>
             </a:fld>
             <a:endParaRPr lang="en-US"/>
           </a:p>
@@ -1764,7 +1764,7 @@
           <a:p>
             <a:fld id="{13F24B86-36D2-4655-BE2F-98B661AC85E1}" type="datetimeFigureOut">
               <a:rPr lang="en-US" smtClean="0"/>
-              <a:t>3/10/2014</a:t>
+              <a:t>3/19/2014</a:t>
             </a:fld>
             <a:endParaRPr lang="en-US"/>
           </a:p>
@@ -1882,7 +1882,7 @@
           <a:p>
             <a:fld id="{13F24B86-36D2-4655-BE2F-98B661AC85E1}" type="datetimeFigureOut">
               <a:rPr lang="en-US" smtClean="0"/>
-              <a:t>3/10/2014</a:t>
+              <a:t>3/19/2014</a:t>
             </a:fld>
             <a:endParaRPr lang="en-US"/>
           </a:p>
@@ -1977,7 +1977,7 @@
           <a:p>
             <a:fld id="{13F24B86-36D2-4655-BE2F-98B661AC85E1}" type="datetimeFigureOut">
               <a:rPr lang="en-US" smtClean="0"/>
-              <a:t>3/10/2014</a:t>
+              <a:t>3/19/2014</a:t>
             </a:fld>
             <a:endParaRPr lang="en-US"/>
           </a:p>
@@ -2254,7 +2254,7 @@
           <a:p>
             <a:fld id="{13F24B86-36D2-4655-BE2F-98B661AC85E1}" type="datetimeFigureOut">
               <a:rPr lang="en-US" smtClean="0"/>
-              <a:t>3/10/2014</a:t>
+              <a:t>3/19/2014</a:t>
             </a:fld>
             <a:endParaRPr lang="en-US"/>
           </a:p>
@@ -2507,7 +2507,7 @@
           <a:p>
             <a:fld id="{13F24B86-36D2-4655-BE2F-98B661AC85E1}" type="datetimeFigureOut">
               <a:rPr lang="en-US" smtClean="0"/>
-              <a:t>3/10/2014</a:t>
+              <a:t>3/19/2014</a:t>
             </a:fld>
             <a:endParaRPr lang="en-US"/>
           </a:p>
@@ -2720,7 +2720,7 @@
           <a:p>
             <a:fld id="{13F24B86-36D2-4655-BE2F-98B661AC85E1}" type="datetimeFigureOut">
               <a:rPr lang="en-US" smtClean="0"/>
-              <a:t>3/10/2014</a:t>
+              <a:t>3/19/2014</a:t>
             </a:fld>
             <a:endParaRPr lang="en-US"/>
           </a:p>
@@ -3104,34 +3104,35 @@
           <p:nvPr>
             <p:extLst>
               <p:ext uri="{D42A27DB-BD31-4B8C-83A1-F6EECF244321}">
-                <p14:modId xmlns:p14="http://schemas.microsoft.com/office/powerpoint/2010/main" val="2031229259"/>
+                <p14:modId xmlns:p14="http://schemas.microsoft.com/office/powerpoint/2010/main" val="920346357"/>
               </p:ext>
             </p:extLst>
           </p:nvPr>
         </p:nvGraphicFramePr>
         <p:xfrm>
-          <a:off x="1219200" y="1447800"/>
-          <a:ext cx="2476500" cy="1994874"/>
+          <a:off x="107407" y="247631"/>
+          <a:ext cx="5560206" cy="3444240"/>
         </p:xfrm>
         <a:graphic>
           <a:graphicData uri="http://schemas.openxmlformats.org/drawingml/2006/table">
             <a:tbl>
-              <a:tblPr bandRow="1">
-                <a:tableStyleId>{3C2FFA5D-87B4-456A-9821-1D502468CF0F}</a:tableStyleId>
+              <a:tblPr firstRow="1" bandRow="1">
+                <a:tableStyleId>{5C22544A-7EE6-4342-B048-85BDC9FD1C3A}</a:tableStyleId>
               </a:tblPr>
               <a:tblGrid>
-                <a:gridCol w="1217468"/>
-                <a:gridCol w="1259032"/>
+                <a:gridCol w="1654718"/>
+                <a:gridCol w="1786378"/>
+                <a:gridCol w="2119110"/>
               </a:tblGrid>
-              <a:tr h="276599">
-                <a:tc gridSpan="2">
+              <a:tr h="175041">
+                <a:tc gridSpan="3">
                   <a:txBody>
                     <a:bodyPr/>
                     <a:lstStyle/>
                     <a:p>
                       <a:pPr algn="ctr"/>
                       <a:r>
-                        <a:rPr lang="en-US" sz="1600" b="1" dirty="0" smtClean="0">
+                        <a:rPr lang="en-US" sz="1600" dirty="0" smtClean="0">
                           <a:solidFill>
                             <a:schemeClr val="bg1"/>
                           </a:solidFill>
@@ -3173,23 +3174,10 @@
                       <a:headEnd type="none" w="med" len="med"/>
                       <a:tailEnd type="none" w="med" len="med"/>
                     </a:lnT>
-                    <a:lnB w="12700" cap="flat" cmpd="sng" algn="ctr">
-                      <a:noFill/>
-                      <a:prstDash val="solid"/>
-                      <a:round/>
-                      <a:headEnd type="none" w="med" len="med"/>
-                      <a:tailEnd type="none" w="med" len="med"/>
-                    </a:lnB>
-                    <a:lnTlToBr w="12700" cmpd="sng">
-                      <a:noFill/>
-                      <a:prstDash val="solid"/>
-                    </a:lnTlToBr>
-                    <a:lnBlToTr w="12700" cmpd="sng">
-                      <a:noFill/>
-                      <a:prstDash val="solid"/>
-                    </a:lnBlToTr>
                     <a:solidFill>
-                      <a:schemeClr val="tx2"/>
+                      <a:schemeClr val="accent1">
+                        <a:lumMod val="75000"/>
+                      </a:schemeClr>
                     </a:solidFill>
                   </a:tcPr>
                 </a:tc>
@@ -3234,18 +3222,28 @@
                     </a:lnBlToTr>
                   </a:tcPr>
                 </a:tc>
+                <a:tc hMerge="1">
+                  <a:txBody>
+                    <a:bodyPr/>
+                    <a:lstStyle/>
+                    <a:p>
+                      <a:endParaRPr lang="en-US"/>
+                    </a:p>
+                  </a:txBody>
+                  <a:tcPr/>
+                </a:tc>
               </a:tr>
-              <a:tr h="276599">
+              <a:tr h="144405">
                 <a:tc>
                   <a:txBody>
                     <a:bodyPr/>
                     <a:lstStyle/>
                     <a:p>
                       <a:r>
-                        <a:rPr lang="en-US" sz="1200" b="0" dirty="0" smtClean="0"/>
-                        <a:t>id</a:t>
+                        <a:rPr lang="en-US" sz="1100" dirty="0" smtClean="0"/>
+                        <a:t>ID</a:t>
                       </a:r>
-                      <a:endParaRPr lang="en-US" sz="1200" b="0" dirty="0"/>
+                      <a:endParaRPr lang="en-US" sz="1100" b="0" dirty="0"/>
                     </a:p>
                   </a:txBody>
                   <a:tcPr>
@@ -3262,6 +3260,230 @@
                       <a:solidFill>
                         <a:schemeClr val="tx1"/>
                       </a:solidFill>
+                      <a:prstDash val="solid"/>
+                      <a:round/>
+                      <a:headEnd type="none" w="med" len="med"/>
+                      <a:tailEnd type="none" w="med" len="med"/>
+                    </a:lnR>
+                  </a:tcPr>
+                </a:tc>
+                <a:tc gridSpan="2">
+                  <a:txBody>
+                    <a:bodyPr/>
+                    <a:lstStyle/>
+                    <a:p>
+                      <a:r>
+                        <a:rPr lang="en-US" sz="1100" dirty="0" smtClean="0"/>
+                        <a:t>example:Indicator-33fe3b22-0201-47cf-85d0-97c02164528d</a:t>
+                      </a:r>
+                      <a:endParaRPr lang="en-US" sz="1100" dirty="0" smtClean="0"/>
+                    </a:p>
+                  </a:txBody>
+                  <a:tcPr>
+                    <a:lnL w="12700" cap="flat" cmpd="sng" algn="ctr">
+                      <a:solidFill>
+                        <a:schemeClr val="tx1"/>
+                      </a:solidFill>
+                      <a:prstDash val="solid"/>
+                      <a:round/>
+                      <a:headEnd type="none" w="med" len="med"/>
+                      <a:tailEnd type="none" w="med" len="med"/>
+                    </a:lnL>
+                    <a:lnR w="12700" cap="flat" cmpd="sng" algn="ctr">
+                      <a:solidFill>
+                        <a:schemeClr val="tx1"/>
+                      </a:solidFill>
+                      <a:prstDash val="solid"/>
+                      <a:round/>
+                      <a:headEnd type="none" w="med" len="med"/>
+                      <a:tailEnd type="none" w="med" len="med"/>
+                    </a:lnR>
+                    <a:lnB w="12700" cap="flat" cmpd="sng" algn="ctr">
+                      <a:noFill/>
+                      <a:prstDash val="solid"/>
+                      <a:round/>
+                      <a:headEnd type="none" w="med" len="med"/>
+                      <a:tailEnd type="none" w="med" len="med"/>
+                    </a:lnB>
+                  </a:tcPr>
+                </a:tc>
+                <a:tc hMerge="1">
+                  <a:txBody>
+                    <a:bodyPr/>
+                    <a:lstStyle/>
+                    <a:p>
+                      <a:endParaRPr lang="en-US"/>
+                    </a:p>
+                  </a:txBody>
+                  <a:tcPr/>
+                </a:tc>
+              </a:tr>
+              <a:tr h="144405">
+                <a:tc>
+                  <a:txBody>
+                    <a:bodyPr/>
+                    <a:lstStyle/>
+                    <a:p>
+                      <a:r>
+                        <a:rPr lang="en-US" sz="1100" dirty="0" smtClean="0"/>
+                        <a:t>Title</a:t>
+                      </a:r>
+                      <a:endParaRPr lang="en-US" sz="1100" b="0" dirty="0"/>
+                    </a:p>
+                  </a:txBody>
+                  <a:tcPr>
+                    <a:lnL w="12700" cap="flat" cmpd="sng" algn="ctr">
+                      <a:solidFill>
+                        <a:schemeClr val="tx1"/>
+                      </a:solidFill>
+                      <a:prstDash val="solid"/>
+                      <a:round/>
+                      <a:headEnd type="none" w="med" len="med"/>
+                      <a:tailEnd type="none" w="med" len="med"/>
+                    </a:lnL>
+                    <a:lnR w="12700" cap="flat" cmpd="sng" algn="ctr">
+                      <a:solidFill>
+                        <a:schemeClr val="tx1"/>
+                      </a:solidFill>
+                      <a:prstDash val="solid"/>
+                      <a:round/>
+                      <a:headEnd type="none" w="med" len="med"/>
+                      <a:tailEnd type="none" w="med" len="med"/>
+                    </a:lnR>
+                  </a:tcPr>
+                </a:tc>
+                <a:tc gridSpan="2">
+                  <a:txBody>
+                    <a:bodyPr/>
+                    <a:lstStyle/>
+                    <a:p>
+                      <a:r>
+                        <a:rPr lang="en-US" sz="1100" dirty="0" smtClean="0"/>
+                        <a:t>IP Address for known C2 Channel</a:t>
+                      </a:r>
+                      <a:endParaRPr lang="en-US" sz="1100" dirty="0" smtClean="0"/>
+                    </a:p>
+                  </a:txBody>
+                  <a:tcPr>
+                    <a:lnL w="12700" cap="flat" cmpd="sng" algn="ctr">
+                      <a:solidFill>
+                        <a:schemeClr val="tx1"/>
+                      </a:solidFill>
+                      <a:prstDash val="solid"/>
+                      <a:round/>
+                      <a:headEnd type="none" w="med" len="med"/>
+                      <a:tailEnd type="none" w="med" len="med"/>
+                    </a:lnL>
+                    <a:lnR w="12700" cap="flat" cmpd="sng" algn="ctr">
+                      <a:solidFill>
+                        <a:schemeClr val="tx1"/>
+                      </a:solidFill>
+                      <a:prstDash val="solid"/>
+                      <a:round/>
+                      <a:headEnd type="none" w="med" len="med"/>
+                      <a:tailEnd type="none" w="med" len="med"/>
+                    </a:lnR>
+                    <a:lnT w="12700" cap="flat" cmpd="sng" algn="ctr">
+                      <a:noFill/>
+                      <a:prstDash val="solid"/>
+                      <a:round/>
+                      <a:headEnd type="none" w="med" len="med"/>
+                      <a:tailEnd type="none" w="med" len="med"/>
+                    </a:lnT>
+                    <a:lnB w="12700" cap="flat" cmpd="sng" algn="ctr">
+                      <a:noFill/>
+                      <a:prstDash val="solid"/>
+                      <a:round/>
+                      <a:headEnd type="none" w="med" len="med"/>
+                      <a:tailEnd type="none" w="med" len="med"/>
+                    </a:lnB>
+                    <a:lnTlToBr w="12700" cmpd="sng">
+                      <a:noFill/>
+                      <a:prstDash val="solid"/>
+                    </a:lnTlToBr>
+                    <a:lnBlToTr w="12700" cmpd="sng">
+                      <a:noFill/>
+                      <a:prstDash val="solid"/>
+                    </a:lnBlToTr>
+                  </a:tcPr>
+                </a:tc>
+                <a:tc hMerge="1">
+                  <a:txBody>
+                    <a:bodyPr/>
+                    <a:lstStyle/>
+                    <a:p>
+                      <a:endParaRPr lang="en-US"/>
+                    </a:p>
+                  </a:txBody>
+                  <a:tcPr/>
+                </a:tc>
+              </a:tr>
+              <a:tr h="144405">
+                <a:tc>
+                  <a:txBody>
+                    <a:bodyPr/>
+                    <a:lstStyle/>
+                    <a:p>
+                      <a:r>
+                        <a:rPr lang="en-US" sz="1100" b="0" dirty="0" smtClean="0"/>
+                        <a:t>Type</a:t>
+                      </a:r>
+                      <a:endParaRPr lang="en-US" sz="1100" b="0" dirty="0"/>
+                    </a:p>
+                  </a:txBody>
+                  <a:tcPr>
+                    <a:lnL w="12700" cap="flat" cmpd="sng" algn="ctr">
+                      <a:solidFill>
+                        <a:schemeClr val="tx1"/>
+                      </a:solidFill>
+                      <a:prstDash val="solid"/>
+                      <a:round/>
+                      <a:headEnd type="none" w="med" len="med"/>
+                      <a:tailEnd type="none" w="med" len="med"/>
+                    </a:lnL>
+                    <a:lnR w="12700" cap="flat" cmpd="sng" algn="ctr">
+                      <a:solidFill>
+                        <a:schemeClr val="tx1"/>
+                      </a:solidFill>
+                      <a:prstDash val="solid"/>
+                      <a:round/>
+                      <a:headEnd type="none" w="med" len="med"/>
+                      <a:tailEnd type="none" w="med" len="med"/>
+                    </a:lnR>
+                  </a:tcPr>
+                </a:tc>
+                <a:tc>
+                  <a:txBody>
+                    <a:bodyPr/>
+                    <a:lstStyle/>
+                    <a:p>
+                      <a:r>
+                        <a:rPr lang="en-US" sz="1100" b="0" dirty="0" smtClean="0"/>
+                        <a:t>IP</a:t>
+                      </a:r>
+                      <a:r>
+                        <a:rPr lang="en-US" sz="1100" b="0" baseline="0" dirty="0" smtClean="0"/>
+                        <a:t> </a:t>
+                      </a:r>
+                      <a:r>
+                        <a:rPr lang="en-US" sz="1100" b="0" baseline="0" dirty="0" err="1" smtClean="0"/>
+                        <a:t>Watchlist</a:t>
+                      </a:r>
+                      <a:endParaRPr lang="en-US" sz="1100" b="0" dirty="0" smtClean="0"/>
+                    </a:p>
+                  </a:txBody>
+                  <a:tcPr>
+                    <a:lnL w="12700" cap="flat" cmpd="sng" algn="ctr">
+                      <a:solidFill>
+                        <a:schemeClr val="tx1"/>
+                      </a:solidFill>
+                      <a:prstDash val="solid"/>
+                      <a:round/>
+                      <a:headEnd type="none" w="med" len="med"/>
+                      <a:tailEnd type="none" w="med" len="med"/>
+                    </a:lnL>
+                    <a:lnR w="12700" cap="flat" cmpd="sng" algn="ctr">
+                      <a:noFill/>
                       <a:prstDash val="solid"/>
                       <a:round/>
                       <a:headEnd type="none" w="med" len="med"/>
@@ -3296,14 +3518,29 @@
                     <a:bodyPr/>
                     <a:lstStyle/>
                     <a:p>
-                      <a:endParaRPr lang="en-US" sz="1200" dirty="0"/>
+                      <a:pPr algn="r"/>
+                      <a:r>
+                        <a:rPr lang="en-US" sz="1100" b="0" dirty="0" smtClean="0">
+                          <a:solidFill>
+                            <a:schemeClr val="bg1">
+                              <a:lumMod val="50000"/>
+                            </a:schemeClr>
+                          </a:solidFill>
+                        </a:rPr>
+                        <a:t>IndicatorTypeVocab-1.1</a:t>
+                      </a:r>
+                      <a:endParaRPr lang="en-US" sz="1100" b="0" dirty="0" smtClean="0">
+                        <a:solidFill>
+                          <a:schemeClr val="bg1">
+                            <a:lumMod val="50000"/>
+                          </a:schemeClr>
+                        </a:solidFill>
+                      </a:endParaRPr>
                     </a:p>
                   </a:txBody>
                   <a:tcPr>
                     <a:lnL w="12700" cap="flat" cmpd="sng" algn="ctr">
-                      <a:solidFill>
-                        <a:schemeClr val="tx1"/>
-                      </a:solidFill>
+                      <a:noFill/>
                       <a:prstDash val="solid"/>
                       <a:round/>
                       <a:headEnd type="none" w="med" len="med"/>
@@ -3343,17 +3580,17 @@
                   </a:tcPr>
                 </a:tc>
               </a:tr>
-              <a:tr h="276599">
+              <a:tr h="144405">
                 <a:tc>
                   <a:txBody>
                     <a:bodyPr/>
                     <a:lstStyle/>
                     <a:p>
                       <a:r>
-                        <a:rPr lang="en-US" sz="1200" b="0" dirty="0" smtClean="0"/>
-                        <a:t>Type</a:t>
+                        <a:rPr lang="en-US" sz="1100" dirty="0" smtClean="0"/>
+                        <a:t>Observable</a:t>
                       </a:r>
-                      <a:endParaRPr lang="en-US" sz="1200" b="0" dirty="0"/>
+                      <a:endParaRPr lang="en-US" sz="1100" b="0" dirty="0"/>
                     </a:p>
                   </a:txBody>
                   <a:tcPr>
@@ -3370,6 +3607,225 @@
                       <a:solidFill>
                         <a:schemeClr val="tx1"/>
                       </a:solidFill>
+                      <a:prstDash val="solid"/>
+                      <a:round/>
+                      <a:headEnd type="none" w="med" len="med"/>
+                      <a:tailEnd type="none" w="med" len="med"/>
+                    </a:lnR>
+                  </a:tcPr>
+                </a:tc>
+                <a:tc gridSpan="2">
+                  <a:txBody>
+                    <a:bodyPr/>
+                    <a:lstStyle/>
+                    <a:p>
+                      <a:endParaRPr lang="en-US" sz="1100" b="0" dirty="0" smtClean="0"/>
+                    </a:p>
+                  </a:txBody>
+                  <a:tcPr>
+                    <a:lnL w="12700" cap="flat" cmpd="sng" algn="ctr">
+                      <a:solidFill>
+                        <a:schemeClr val="tx1"/>
+                      </a:solidFill>
+                      <a:prstDash val="solid"/>
+                      <a:round/>
+                      <a:headEnd type="none" w="med" len="med"/>
+                      <a:tailEnd type="none" w="med" len="med"/>
+                    </a:lnL>
+                    <a:lnR w="12700" cap="flat" cmpd="sng" algn="ctr">
+                      <a:solidFill>
+                        <a:schemeClr val="tx1"/>
+                      </a:solidFill>
+                      <a:prstDash val="solid"/>
+                      <a:round/>
+                      <a:headEnd type="none" w="med" len="med"/>
+                      <a:tailEnd type="none" w="med" len="med"/>
+                    </a:lnR>
+                    <a:lnT w="12700" cap="flat" cmpd="sng" algn="ctr">
+                      <a:noFill/>
+                      <a:prstDash val="solid"/>
+                      <a:round/>
+                      <a:headEnd type="none" w="med" len="med"/>
+                      <a:tailEnd type="none" w="med" len="med"/>
+                    </a:lnT>
+                    <a:lnB w="12700" cap="flat" cmpd="sng" algn="ctr">
+                      <a:noFill/>
+                      <a:prstDash val="solid"/>
+                      <a:round/>
+                      <a:headEnd type="none" w="med" len="med"/>
+                      <a:tailEnd type="none" w="med" len="med"/>
+                    </a:lnB>
+                    <a:lnTlToBr w="12700" cmpd="sng">
+                      <a:noFill/>
+                      <a:prstDash val="solid"/>
+                    </a:lnTlToBr>
+                    <a:lnBlToTr w="12700" cmpd="sng">
+                      <a:noFill/>
+                      <a:prstDash val="solid"/>
+                    </a:lnBlToTr>
+                  </a:tcPr>
+                </a:tc>
+                <a:tc hMerge="1">
+                  <a:txBody>
+                    <a:bodyPr/>
+                    <a:lstStyle/>
+                    <a:p>
+                      <a:endParaRPr lang="en-US"/>
+                    </a:p>
+                  </a:txBody>
+                  <a:tcPr/>
+                </a:tc>
+              </a:tr>
+              <a:tr h="144405">
+                <a:tc>
+                  <a:txBody>
+                    <a:bodyPr/>
+                    <a:lstStyle/>
+                    <a:p>
+                      <a:r>
+                        <a:rPr lang="en-US" sz="1100" dirty="0" smtClean="0"/>
+                        <a:t>    Object</a:t>
+                      </a:r>
+                      <a:endParaRPr lang="en-US" sz="1100" b="0" dirty="0"/>
+                    </a:p>
+                  </a:txBody>
+                  <a:tcPr>
+                    <a:lnL w="12700" cap="flat" cmpd="sng" algn="ctr">
+                      <a:solidFill>
+                        <a:schemeClr val="tx1"/>
+                      </a:solidFill>
+                      <a:prstDash val="solid"/>
+                      <a:round/>
+                      <a:headEnd type="none" w="med" len="med"/>
+                      <a:tailEnd type="none" w="med" len="med"/>
+                    </a:lnL>
+                    <a:lnR w="12700" cap="flat" cmpd="sng" algn="ctr">
+                      <a:solidFill>
+                        <a:schemeClr val="tx1"/>
+                      </a:solidFill>
+                      <a:prstDash val="solid"/>
+                      <a:round/>
+                      <a:headEnd type="none" w="med" len="med"/>
+                      <a:tailEnd type="none" w="med" len="med"/>
+                    </a:lnR>
+                  </a:tcPr>
+                </a:tc>
+                <a:tc gridSpan="2">
+                  <a:txBody>
+                    <a:bodyPr/>
+                    <a:lstStyle/>
+                    <a:p>
+                      <a:endParaRPr lang="en-US" sz="1100" b="0" dirty="0" smtClean="0"/>
+                    </a:p>
+                  </a:txBody>
+                  <a:tcPr>
+                    <a:lnL w="12700" cap="flat" cmpd="sng" algn="ctr">
+                      <a:solidFill>
+                        <a:schemeClr val="tx1"/>
+                      </a:solidFill>
+                      <a:prstDash val="solid"/>
+                      <a:round/>
+                      <a:headEnd type="none" w="med" len="med"/>
+                      <a:tailEnd type="none" w="med" len="med"/>
+                    </a:lnL>
+                    <a:lnR w="12700" cap="flat" cmpd="sng" algn="ctr">
+                      <a:solidFill>
+                        <a:schemeClr val="tx1"/>
+                      </a:solidFill>
+                      <a:prstDash val="solid"/>
+                      <a:round/>
+                      <a:headEnd type="none" w="med" len="med"/>
+                      <a:tailEnd type="none" w="med" len="med"/>
+                    </a:lnR>
+                    <a:lnT w="12700" cap="flat" cmpd="sng" algn="ctr">
+                      <a:noFill/>
+                      <a:prstDash val="solid"/>
+                      <a:round/>
+                      <a:headEnd type="none" w="med" len="med"/>
+                      <a:tailEnd type="none" w="med" len="med"/>
+                    </a:lnT>
+                    <a:lnB w="12700" cap="flat" cmpd="sng" algn="ctr">
+                      <a:noFill/>
+                      <a:prstDash val="solid"/>
+                      <a:round/>
+                      <a:headEnd type="none" w="med" len="med"/>
+                      <a:tailEnd type="none" w="med" len="med"/>
+                    </a:lnB>
+                    <a:lnTlToBr w="12700" cmpd="sng">
+                      <a:noFill/>
+                      <a:prstDash val="solid"/>
+                    </a:lnTlToBr>
+                    <a:lnBlToTr w="12700" cmpd="sng">
+                      <a:noFill/>
+                      <a:prstDash val="solid"/>
+                    </a:lnBlToTr>
+                  </a:tcPr>
+                </a:tc>
+                <a:tc hMerge="1">
+                  <a:txBody>
+                    <a:bodyPr/>
+                    <a:lstStyle/>
+                    <a:p>
+                      <a:endParaRPr lang="en-US"/>
+                    </a:p>
+                  </a:txBody>
+                  <a:tcPr/>
+                </a:tc>
+              </a:tr>
+              <a:tr h="144405">
+                <a:tc>
+                  <a:txBody>
+                    <a:bodyPr/>
+                    <a:lstStyle/>
+                    <a:p>
+                      <a:r>
+                        <a:rPr lang="en-US" sz="1100" b="0" dirty="0" smtClean="0"/>
+                        <a:t>        Properties</a:t>
+                      </a:r>
+                      <a:endParaRPr lang="en-US" sz="1100" b="0" dirty="0"/>
+                    </a:p>
+                  </a:txBody>
+                  <a:tcPr>
+                    <a:lnL w="12700" cap="flat" cmpd="sng" algn="ctr">
+                      <a:solidFill>
+                        <a:schemeClr val="tx1"/>
+                      </a:solidFill>
+                      <a:prstDash val="solid"/>
+                      <a:round/>
+                      <a:headEnd type="none" w="med" len="med"/>
+                      <a:tailEnd type="none" w="med" len="med"/>
+                    </a:lnL>
+                    <a:lnR w="12700" cap="flat" cmpd="sng" algn="ctr">
+                      <a:solidFill>
+                        <a:schemeClr val="tx1"/>
+                      </a:solidFill>
+                      <a:prstDash val="solid"/>
+                      <a:round/>
+                      <a:headEnd type="none" w="med" len="med"/>
+                      <a:tailEnd type="none" w="med" len="med"/>
+                    </a:lnR>
+                  </a:tcPr>
+                </a:tc>
+                <a:tc>
+                  <a:txBody>
+                    <a:bodyPr/>
+                    <a:lstStyle/>
+                    <a:p>
+                      <a:endParaRPr lang="en-US" sz="1100" b="0" dirty="0" smtClean="0"/>
+                    </a:p>
+                  </a:txBody>
+                  <a:tcPr>
+                    <a:lnL w="12700" cap="flat" cmpd="sng" algn="ctr">
+                      <a:solidFill>
+                        <a:schemeClr val="tx1"/>
+                      </a:solidFill>
+                      <a:prstDash val="solid"/>
+                      <a:round/>
+                      <a:headEnd type="none" w="med" len="med"/>
+                      <a:tailEnd type="none" w="med" len="med"/>
+                    </a:lnL>
+                    <a:lnR w="12700" cap="flat" cmpd="sng" algn="ctr">
+                      <a:noFill/>
                       <a:prstDash val="solid"/>
                       <a:round/>
                       <a:headEnd type="none" w="med" len="med"/>
@@ -3404,18 +3860,29 @@
                     <a:bodyPr/>
                     <a:lstStyle/>
                     <a:p>
+                      <a:pPr algn="r"/>
                       <a:r>
-                        <a:rPr lang="en-US" sz="1200" dirty="0" smtClean="0"/>
-                        <a:t>C2</a:t>
+                        <a:rPr lang="en-US" sz="1100" b="0" dirty="0" err="1" smtClean="0">
+                          <a:solidFill>
+                            <a:schemeClr val="bg1">
+                              <a:lumMod val="50000"/>
+                            </a:schemeClr>
+                          </a:solidFill>
+                        </a:rPr>
+                        <a:t>AddressObjectType</a:t>
                       </a:r>
-                      <a:endParaRPr lang="en-US" sz="1200" dirty="0"/>
+                      <a:endParaRPr lang="en-US" sz="1100" b="0" dirty="0" smtClean="0">
+                        <a:solidFill>
+                          <a:schemeClr val="bg1">
+                            <a:lumMod val="50000"/>
+                          </a:schemeClr>
+                        </a:solidFill>
+                      </a:endParaRPr>
                     </a:p>
                   </a:txBody>
                   <a:tcPr>
                     <a:lnL w="12700" cap="flat" cmpd="sng" algn="ctr">
-                      <a:solidFill>
-                        <a:schemeClr val="tx1"/>
-                      </a:solidFill>
+                      <a:noFill/>
                       <a:prstDash val="solid"/>
                       <a:round/>
                       <a:headEnd type="none" w="med" len="med"/>
@@ -3455,17 +3922,17 @@
                   </a:tcPr>
                 </a:tc>
               </a:tr>
-              <a:tr h="276599">
+              <a:tr h="144405">
                 <a:tc>
                   <a:txBody>
                     <a:bodyPr/>
                     <a:lstStyle/>
                     <a:p>
                       <a:r>
-                        <a:rPr lang="en-US" sz="1200" b="0" dirty="0" smtClean="0"/>
-                        <a:t>Address Object</a:t>
+                        <a:rPr lang="en-US" sz="1100" b="0" dirty="0" smtClean="0"/>
+                        <a:t>            Category</a:t>
                       </a:r>
-                      <a:endParaRPr lang="en-US" sz="1200" b="0" dirty="0"/>
+                      <a:endParaRPr lang="en-US" sz="1100" b="0" dirty="0"/>
                     </a:p>
                   </a:txBody>
                   <a:tcPr>
@@ -3482,6 +3949,37 @@
                       <a:solidFill>
                         <a:schemeClr val="tx1"/>
                       </a:solidFill>
+                      <a:prstDash val="solid"/>
+                      <a:round/>
+                      <a:headEnd type="none" w="med" len="med"/>
+                      <a:tailEnd type="none" w="med" len="med"/>
+                    </a:lnR>
+                  </a:tcPr>
+                </a:tc>
+                <a:tc>
+                  <a:txBody>
+                    <a:bodyPr/>
+                    <a:lstStyle/>
+                    <a:p>
+                      <a:r>
+                        <a:rPr lang="en-US" sz="1100" b="0" dirty="0" smtClean="0"/>
+                        <a:t>ipv4-addr</a:t>
+                      </a:r>
+                      <a:endParaRPr lang="en-US" sz="1100" b="0" dirty="0" smtClean="0"/>
+                    </a:p>
+                  </a:txBody>
+                  <a:tcPr>
+                    <a:lnL w="12700" cap="flat" cmpd="sng" algn="ctr">
+                      <a:solidFill>
+                        <a:schemeClr val="tx1"/>
+                      </a:solidFill>
+                      <a:prstDash val="solid"/>
+                      <a:round/>
+                      <a:headEnd type="none" w="med" len="med"/>
+                      <a:tailEnd type="none" w="med" len="med"/>
+                    </a:lnL>
+                    <a:lnR w="12700" cap="flat" cmpd="sng" algn="ctr">
+                      <a:noFill/>
                       <a:prstDash val="solid"/>
                       <a:round/>
                       <a:headEnd type="none" w="med" len="med"/>
@@ -3516,18 +4014,19 @@
                     <a:bodyPr/>
                     <a:lstStyle/>
                     <a:p>
-                      <a:r>
-                        <a:rPr lang="en-US" sz="1200" dirty="0" smtClean="0"/>
-                        <a:t>Address Object</a:t>
-                      </a:r>
-                      <a:endParaRPr lang="en-US" sz="1200" b="0" dirty="0" smtClean="0"/>
+                      <a:pPr algn="r"/>
+                      <a:endParaRPr lang="en-US" sz="1100" b="0" dirty="0" smtClean="0">
+                        <a:solidFill>
+                          <a:schemeClr val="bg1">
+                            <a:lumMod val="50000"/>
+                          </a:schemeClr>
+                        </a:solidFill>
+                      </a:endParaRPr>
                     </a:p>
                   </a:txBody>
                   <a:tcPr>
                     <a:lnL w="12700" cap="flat" cmpd="sng" algn="ctr">
-                      <a:solidFill>
-                        <a:schemeClr val="tx1"/>
-                      </a:solidFill>
+                      <a:noFill/>
                       <a:prstDash val="solid"/>
                       <a:round/>
                       <a:headEnd type="none" w="med" len="med"/>
@@ -3567,16 +4066,21 @@
                   </a:tcPr>
                 </a:tc>
               </a:tr>
-              <a:tr h="276599">
+              <a:tr h="144405">
                 <a:tc>
                   <a:txBody>
                     <a:bodyPr/>
                     <a:lstStyle/>
                     <a:p>
                       <a:r>
-                        <a:rPr lang="en-US" sz="1200" b="0" dirty="0" smtClean="0"/>
-                        <a:t>    Address Value</a:t>
+                        <a:rPr lang="en-US" sz="1100" b="0" dirty="0" smtClean="0"/>
+                        <a:t>            </a:t>
                       </a:r>
+                      <a:r>
+                        <a:rPr lang="en-US" sz="1100" b="0" dirty="0" err="1" smtClean="0"/>
+                        <a:t>Address_Value</a:t>
+                      </a:r>
+                      <a:endParaRPr lang="en-US" sz="1100" b="0" dirty="0"/>
                     </a:p>
                   </a:txBody>
                   <a:tcPr>
@@ -3593,6 +4097,37 @@
                       <a:solidFill>
                         <a:schemeClr val="tx1"/>
                       </a:solidFill>
+                      <a:prstDash val="solid"/>
+                      <a:round/>
+                      <a:headEnd type="none" w="med" len="med"/>
+                      <a:tailEnd type="none" w="med" len="med"/>
+                    </a:lnR>
+                  </a:tcPr>
+                </a:tc>
+                <a:tc>
+                  <a:txBody>
+                    <a:bodyPr/>
+                    <a:lstStyle/>
+                    <a:p>
+                      <a:r>
+                        <a:rPr lang="en-US" sz="1100" b="0" dirty="0" smtClean="0"/>
+                        <a:t>10.0.0.0</a:t>
+                      </a:r>
+                      <a:endParaRPr lang="en-US" sz="1100" b="0" dirty="0" smtClean="0"/>
+                    </a:p>
+                  </a:txBody>
+                  <a:tcPr>
+                    <a:lnL w="12700" cap="flat" cmpd="sng" algn="ctr">
+                      <a:solidFill>
+                        <a:schemeClr val="tx1"/>
+                      </a:solidFill>
+                      <a:prstDash val="solid"/>
+                      <a:round/>
+                      <a:headEnd type="none" w="med" len="med"/>
+                      <a:tailEnd type="none" w="med" len="med"/>
+                    </a:lnL>
+                    <a:lnR w="12700" cap="flat" cmpd="sng" algn="ctr">
+                      <a:noFill/>
                       <a:prstDash val="solid"/>
                       <a:round/>
                       <a:headEnd type="none" w="med" len="med"/>
@@ -3627,18 +4162,19 @@
                     <a:bodyPr/>
                     <a:lstStyle/>
                     <a:p>
-                      <a:r>
-                        <a:rPr lang="en-US" sz="1200" dirty="0" smtClean="0"/>
-                        <a:t>10.0.0.0</a:t>
-                      </a:r>
-                      <a:endParaRPr lang="en-US" sz="1200" dirty="0"/>
+                      <a:pPr algn="r"/>
+                      <a:endParaRPr lang="en-US" sz="1100" b="0" dirty="0" smtClean="0">
+                        <a:solidFill>
+                          <a:schemeClr val="bg1">
+                            <a:lumMod val="50000"/>
+                          </a:schemeClr>
+                        </a:solidFill>
+                      </a:endParaRPr>
                     </a:p>
                   </a:txBody>
                   <a:tcPr>
                     <a:lnL w="12700" cap="flat" cmpd="sng" algn="ctr">
-                      <a:solidFill>
-                        <a:schemeClr val="tx1"/>
-                      </a:solidFill>
+                      <a:noFill/>
                       <a:prstDash val="solid"/>
                       <a:round/>
                       <a:headEnd type="none" w="med" len="med"/>
@@ -3678,17 +4214,17 @@
                   </a:tcPr>
                 </a:tc>
               </a:tr>
-              <a:tr h="276599">
+              <a:tr h="144405">
                 <a:tc>
                   <a:txBody>
                     <a:bodyPr/>
                     <a:lstStyle/>
                     <a:p>
                       <a:r>
-                        <a:rPr lang="en-US" sz="1200" b="0" dirty="0" err="1" smtClean="0"/>
-                        <a:t>Indicated_TTP</a:t>
+                        <a:rPr lang="en-US" sz="1100" b="0" dirty="0" smtClean="0"/>
+                        <a:t>                Condition</a:t>
                       </a:r>
-                      <a:endParaRPr lang="en-US" sz="1200" b="0" dirty="0"/>
+                      <a:endParaRPr lang="en-US" sz="1100" b="0" dirty="0"/>
                     </a:p>
                   </a:txBody>
                   <a:tcPr>
@@ -3705,6 +4241,37 @@
                       <a:solidFill>
                         <a:schemeClr val="tx1"/>
                       </a:solidFill>
+                      <a:prstDash val="solid"/>
+                      <a:round/>
+                      <a:headEnd type="none" w="med" len="med"/>
+                      <a:tailEnd type="none" w="med" len="med"/>
+                    </a:lnR>
+                  </a:tcPr>
+                </a:tc>
+                <a:tc>
+                  <a:txBody>
+                    <a:bodyPr/>
+                    <a:lstStyle/>
+                    <a:p>
+                      <a:r>
+                        <a:rPr lang="en-US" sz="1100" b="0" dirty="0" smtClean="0"/>
+                        <a:t>Equals</a:t>
+                      </a:r>
+                      <a:endParaRPr lang="en-US" sz="1100" b="0" dirty="0" smtClean="0"/>
+                    </a:p>
+                  </a:txBody>
+                  <a:tcPr>
+                    <a:lnL w="12700" cap="flat" cmpd="sng" algn="ctr">
+                      <a:solidFill>
+                        <a:schemeClr val="tx1"/>
+                      </a:solidFill>
+                      <a:prstDash val="solid"/>
+                      <a:round/>
+                      <a:headEnd type="none" w="med" len="med"/>
+                      <a:tailEnd type="none" w="med" len="med"/>
+                    </a:lnL>
+                    <a:lnR w="12700" cap="flat" cmpd="sng" algn="ctr">
+                      <a:noFill/>
                       <a:prstDash val="solid"/>
                       <a:round/>
                       <a:headEnd type="none" w="med" len="med"/>
@@ -3739,14 +4306,19 @@
                     <a:bodyPr/>
                     <a:lstStyle/>
                     <a:p>
-                      <a:endParaRPr lang="en-US" sz="1200" dirty="0"/>
+                      <a:pPr algn="r"/>
+                      <a:endParaRPr lang="en-US" sz="1100" b="0" dirty="0" smtClean="0">
+                        <a:solidFill>
+                          <a:schemeClr val="bg1">
+                            <a:lumMod val="50000"/>
+                          </a:schemeClr>
+                        </a:solidFill>
+                      </a:endParaRPr>
                     </a:p>
                   </a:txBody>
                   <a:tcPr>
                     <a:lnL w="12700" cap="flat" cmpd="sng" algn="ctr">
-                      <a:solidFill>
-                        <a:schemeClr val="tx1"/>
-                      </a:solidFill>
+                      <a:noFill/>
                       <a:prstDash val="solid"/>
                       <a:round/>
                       <a:headEnd type="none" w="med" len="med"/>
@@ -3786,21 +4358,17 @@
                   </a:tcPr>
                 </a:tc>
               </a:tr>
-              <a:tr h="276599">
+              <a:tr h="144405">
                 <a:tc>
                   <a:txBody>
                     <a:bodyPr/>
                     <a:lstStyle/>
                     <a:p>
                       <a:r>
-                        <a:rPr lang="en-US" sz="1200" b="0" dirty="0" smtClean="0"/>
-                        <a:t>    </a:t>
+                        <a:rPr lang="en-US" sz="1100" b="0" dirty="0" smtClean="0"/>
+                        <a:t>Indicated TTP</a:t>
                       </a:r>
-                      <a:r>
-                        <a:rPr lang="en-US" sz="1200" b="0" dirty="0" err="1" smtClean="0"/>
-                        <a:t>idref</a:t>
-                      </a:r>
-                      <a:endParaRPr lang="en-US" sz="1200" b="0" dirty="0"/>
+                      <a:endParaRPr lang="en-US" sz="1100" b="0" dirty="0"/>
                     </a:p>
                   </a:txBody>
                   <a:tcPr>
@@ -3822,6 +4390,33 @@
                       <a:headEnd type="none" w="med" len="med"/>
                       <a:tailEnd type="none" w="med" len="med"/>
                     </a:lnR>
+                  </a:tcPr>
+                </a:tc>
+                <a:tc>
+                  <a:txBody>
+                    <a:bodyPr/>
+                    <a:lstStyle/>
+                    <a:p>
+                      <a:endParaRPr lang="en-US" sz="1100" b="0" dirty="0" smtClean="0"/>
+                    </a:p>
+                  </a:txBody>
+                  <a:tcPr>
+                    <a:lnL w="12700" cap="flat" cmpd="sng" algn="ctr">
+                      <a:solidFill>
+                        <a:schemeClr val="tx1"/>
+                      </a:solidFill>
+                      <a:prstDash val="solid"/>
+                      <a:round/>
+                      <a:headEnd type="none" w="med" len="med"/>
+                      <a:tailEnd type="none" w="med" len="med"/>
+                    </a:lnL>
+                    <a:lnR w="12700" cap="flat" cmpd="sng" algn="ctr">
+                      <a:noFill/>
+                      <a:prstDash val="solid"/>
+                      <a:round/>
+                      <a:headEnd type="none" w="med" len="med"/>
+                      <a:tailEnd type="none" w="med" len="med"/>
+                    </a:lnR>
                     <a:lnT w="12700" cap="flat" cmpd="sng" algn="ctr">
                       <a:noFill/>
                       <a:prstDash val="solid"/>
@@ -3830,9 +4425,7 @@
                       <a:tailEnd type="none" w="med" len="med"/>
                     </a:lnT>
                     <a:lnB w="12700" cap="flat" cmpd="sng" algn="ctr">
-                      <a:solidFill>
-                        <a:schemeClr val="tx1"/>
-                      </a:solidFill>
+                      <a:noFill/>
                       <a:prstDash val="solid"/>
                       <a:round/>
                       <a:headEnd type="none" w="med" len="med"/>
@@ -3853,14 +4446,320 @@
                     <a:bodyPr/>
                     <a:lstStyle/>
                     <a:p>
-                      <a:endParaRPr lang="en-US" sz="1200" dirty="0"/>
+                      <a:pPr algn="r"/>
+                      <a:endParaRPr lang="en-US" sz="1100" b="0" dirty="0" smtClean="0">
+                        <a:solidFill>
+                          <a:schemeClr val="bg1">
+                            <a:lumMod val="50000"/>
+                          </a:schemeClr>
+                        </a:solidFill>
+                      </a:endParaRPr>
                     </a:p>
                   </a:txBody>
                   <a:tcPr>
                     <a:lnL w="12700" cap="flat" cmpd="sng" algn="ctr">
-                      <a:solidFill>
-                        <a:schemeClr val="tx1"/>
-                      </a:solidFill>
+                      <a:noFill/>
+                      <a:prstDash val="solid"/>
+                      <a:round/>
+                      <a:headEnd type="none" w="med" len="med"/>
+                      <a:tailEnd type="none" w="med" len="med"/>
+                    </a:lnL>
+                    <a:lnR w="12700" cap="flat" cmpd="sng" algn="ctr">
+                      <a:solidFill>
+                        <a:schemeClr val="tx1"/>
+                      </a:solidFill>
+                      <a:prstDash val="solid"/>
+                      <a:round/>
+                      <a:headEnd type="none" w="med" len="med"/>
+                      <a:tailEnd type="none" w="med" len="med"/>
+                    </a:lnR>
+                    <a:lnT w="12700" cap="flat" cmpd="sng" algn="ctr">
+                      <a:noFill/>
+                      <a:prstDash val="solid"/>
+                      <a:round/>
+                      <a:headEnd type="none" w="med" len="med"/>
+                      <a:tailEnd type="none" w="med" len="med"/>
+                    </a:lnT>
+                    <a:lnB w="12700" cap="flat" cmpd="sng" algn="ctr">
+                      <a:noFill/>
+                      <a:prstDash val="solid"/>
+                      <a:round/>
+                      <a:headEnd type="none" w="med" len="med"/>
+                      <a:tailEnd type="none" w="med" len="med"/>
+                    </a:lnB>
+                    <a:lnTlToBr w="12700" cmpd="sng">
+                      <a:noFill/>
+                      <a:prstDash val="solid"/>
+                    </a:lnTlToBr>
+                    <a:lnBlToTr w="12700" cmpd="sng">
+                      <a:noFill/>
+                      <a:prstDash val="solid"/>
+                    </a:lnBlToTr>
+                  </a:tcPr>
+                </a:tc>
+              </a:tr>
+              <a:tr h="144405">
+                <a:tc>
+                  <a:txBody>
+                    <a:bodyPr/>
+                    <a:lstStyle/>
+                    <a:p>
+                      <a:r>
+                        <a:rPr lang="en-US" sz="1100" b="0" dirty="0" smtClean="0"/>
+                        <a:t>    TTP</a:t>
+                      </a:r>
+                      <a:endParaRPr lang="en-US" sz="1100" b="0" dirty="0"/>
+                    </a:p>
+                  </a:txBody>
+                  <a:tcPr>
+                    <a:lnL w="12700" cap="flat" cmpd="sng" algn="ctr">
+                      <a:solidFill>
+                        <a:schemeClr val="tx1"/>
+                      </a:solidFill>
+                      <a:prstDash val="solid"/>
+                      <a:round/>
+                      <a:headEnd type="none" w="med" len="med"/>
+                      <a:tailEnd type="none" w="med" len="med"/>
+                    </a:lnL>
+                    <a:lnR w="12700" cap="flat" cmpd="sng" algn="ctr">
+                      <a:solidFill>
+                        <a:schemeClr val="tx1"/>
+                      </a:solidFill>
+                      <a:prstDash val="solid"/>
+                      <a:round/>
+                      <a:headEnd type="none" w="med" len="med"/>
+                      <a:tailEnd type="none" w="med" len="med"/>
+                    </a:lnR>
+                  </a:tcPr>
+                </a:tc>
+                <a:tc>
+                  <a:txBody>
+                    <a:bodyPr/>
+                    <a:lstStyle/>
+                    <a:p>
+                      <a:endParaRPr lang="en-US" sz="1100" b="0" dirty="0" smtClean="0"/>
+                    </a:p>
+                  </a:txBody>
+                  <a:tcPr>
+                    <a:lnL w="12700" cap="flat" cmpd="sng" algn="ctr">
+                      <a:solidFill>
+                        <a:schemeClr val="tx1"/>
+                      </a:solidFill>
+                      <a:prstDash val="solid"/>
+                      <a:round/>
+                      <a:headEnd type="none" w="med" len="med"/>
+                      <a:tailEnd type="none" w="med" len="med"/>
+                    </a:lnL>
+                    <a:lnR w="12700" cap="flat" cmpd="sng" algn="ctr">
+                      <a:noFill/>
+                      <a:prstDash val="solid"/>
+                      <a:round/>
+                      <a:headEnd type="none" w="med" len="med"/>
+                      <a:tailEnd type="none" w="med" len="med"/>
+                    </a:lnR>
+                    <a:lnT w="12700" cap="flat" cmpd="sng" algn="ctr">
+                      <a:noFill/>
+                      <a:prstDash val="solid"/>
+                      <a:round/>
+                      <a:headEnd type="none" w="med" len="med"/>
+                      <a:tailEnd type="none" w="med" len="med"/>
+                    </a:lnT>
+                    <a:lnB w="12700" cap="flat" cmpd="sng" algn="ctr">
+                      <a:noFill/>
+                      <a:prstDash val="solid"/>
+                      <a:round/>
+                      <a:headEnd type="none" w="med" len="med"/>
+                      <a:tailEnd type="none" w="med" len="med"/>
+                    </a:lnB>
+                    <a:lnTlToBr w="12700" cmpd="sng">
+                      <a:noFill/>
+                      <a:prstDash val="solid"/>
+                    </a:lnTlToBr>
+                    <a:lnBlToTr w="12700" cmpd="sng">
+                      <a:noFill/>
+                      <a:prstDash val="solid"/>
+                    </a:lnBlToTr>
+                  </a:tcPr>
+                </a:tc>
+                <a:tc>
+                  <a:txBody>
+                    <a:bodyPr/>
+                    <a:lstStyle/>
+                    <a:p>
+                      <a:pPr algn="r"/>
+                      <a:endParaRPr lang="en-US" sz="1100" b="0" dirty="0" smtClean="0">
+                        <a:solidFill>
+                          <a:schemeClr val="bg1">
+                            <a:lumMod val="50000"/>
+                          </a:schemeClr>
+                        </a:solidFill>
+                      </a:endParaRPr>
+                    </a:p>
+                  </a:txBody>
+                  <a:tcPr>
+                    <a:lnL w="12700" cap="flat" cmpd="sng" algn="ctr">
+                      <a:noFill/>
+                      <a:prstDash val="solid"/>
+                      <a:round/>
+                      <a:headEnd type="none" w="med" len="med"/>
+                      <a:tailEnd type="none" w="med" len="med"/>
+                    </a:lnL>
+                    <a:lnR w="12700" cap="flat" cmpd="sng" algn="ctr">
+                      <a:solidFill>
+                        <a:schemeClr val="tx1"/>
+                      </a:solidFill>
+                      <a:prstDash val="solid"/>
+                      <a:round/>
+                      <a:headEnd type="none" w="med" len="med"/>
+                      <a:tailEnd type="none" w="med" len="med"/>
+                    </a:lnR>
+                    <a:lnT w="12700" cap="flat" cmpd="sng" algn="ctr">
+                      <a:noFill/>
+                      <a:prstDash val="solid"/>
+                      <a:round/>
+                      <a:headEnd type="none" w="med" len="med"/>
+                      <a:tailEnd type="none" w="med" len="med"/>
+                    </a:lnT>
+                    <a:lnB w="12700" cap="flat" cmpd="sng" algn="ctr">
+                      <a:noFill/>
+                      <a:prstDash val="solid"/>
+                      <a:round/>
+                      <a:headEnd type="none" w="med" len="med"/>
+                      <a:tailEnd type="none" w="med" len="med"/>
+                    </a:lnB>
+                    <a:lnTlToBr w="12700" cmpd="sng">
+                      <a:noFill/>
+                      <a:prstDash val="solid"/>
+                    </a:lnTlToBr>
+                    <a:lnBlToTr w="12700" cmpd="sng">
+                      <a:noFill/>
+                      <a:prstDash val="solid"/>
+                    </a:lnBlToTr>
+                  </a:tcPr>
+                </a:tc>
+              </a:tr>
+              <a:tr h="144405">
+                <a:tc>
+                  <a:txBody>
+                    <a:bodyPr/>
+                    <a:lstStyle/>
+                    <a:p>
+                      <a:r>
+                        <a:rPr lang="en-US" sz="1100" b="0" dirty="0" smtClean="0"/>
+                        <a:t>        </a:t>
+                      </a:r>
+                      <a:r>
+                        <a:rPr lang="en-US" sz="1100" b="0" dirty="0" err="1" smtClean="0"/>
+                        <a:t>idref</a:t>
+                      </a:r>
+                      <a:endParaRPr lang="en-US" sz="1100" b="0" dirty="0"/>
+                    </a:p>
+                  </a:txBody>
+                  <a:tcPr>
+                    <a:lnL w="12700" cap="flat" cmpd="sng" algn="ctr">
+                      <a:solidFill>
+                        <a:schemeClr val="tx1"/>
+                      </a:solidFill>
+                      <a:prstDash val="solid"/>
+                      <a:round/>
+                      <a:headEnd type="none" w="med" len="med"/>
+                      <a:tailEnd type="none" w="med" len="med"/>
+                    </a:lnL>
+                    <a:lnR w="12700" cap="flat" cmpd="sng" algn="ctr">
+                      <a:solidFill>
+                        <a:schemeClr val="tx1"/>
+                      </a:solidFill>
+                      <a:prstDash val="solid"/>
+                      <a:round/>
+                      <a:headEnd type="none" w="med" len="med"/>
+                      <a:tailEnd type="none" w="med" len="med"/>
+                    </a:lnR>
+                    <a:lnB w="12700" cap="flat" cmpd="sng" algn="ctr">
+                      <a:solidFill>
+                        <a:schemeClr val="tx1"/>
+                      </a:solidFill>
+                      <a:prstDash val="solid"/>
+                      <a:round/>
+                      <a:headEnd type="none" w="med" len="med"/>
+                      <a:tailEnd type="none" w="med" len="med"/>
+                    </a:lnB>
+                  </a:tcPr>
+                </a:tc>
+                <a:tc gridSpan="2">
+                  <a:txBody>
+                    <a:bodyPr/>
+                    <a:lstStyle/>
+                    <a:p>
+                      <a:r>
+                        <a:rPr lang="en-US" sz="1100" b="0" dirty="0" smtClean="0"/>
+                        <a:t>example:TTP-bc66360d-a7d1-4d8c-ad1a-ea3a13d62da9</a:t>
+                      </a:r>
+                      <a:endParaRPr lang="en-US" sz="1100" b="0" dirty="0" smtClean="0"/>
+                    </a:p>
+                  </a:txBody>
+                  <a:tcPr>
+                    <a:lnL w="12700" cap="flat" cmpd="sng" algn="ctr">
+                      <a:solidFill>
+                        <a:schemeClr val="tx1"/>
+                      </a:solidFill>
+                      <a:prstDash val="solid"/>
+                      <a:round/>
+                      <a:headEnd type="none" w="med" len="med"/>
+                      <a:tailEnd type="none" w="med" len="med"/>
+                    </a:lnL>
+                    <a:lnR w="12700" cap="flat" cmpd="sng" algn="ctr">
+                      <a:solidFill>
+                        <a:schemeClr val="tx1"/>
+                      </a:solidFill>
+                      <a:prstDash val="solid"/>
+                      <a:round/>
+                      <a:headEnd type="none" w="med" len="med"/>
+                      <a:tailEnd type="none" w="med" len="med"/>
+                    </a:lnR>
+                    <a:lnT w="12700" cap="flat" cmpd="sng" algn="ctr">
+                      <a:noFill/>
+                      <a:prstDash val="solid"/>
+                      <a:round/>
+                      <a:headEnd type="none" w="med" len="med"/>
+                      <a:tailEnd type="none" w="med" len="med"/>
+                    </a:lnT>
+                    <a:lnB w="12700" cap="flat" cmpd="sng" algn="ctr">
+                      <a:solidFill>
+                        <a:schemeClr val="tx1"/>
+                      </a:solidFill>
+                      <a:prstDash val="solid"/>
+                      <a:round/>
+                      <a:headEnd type="none" w="med" len="med"/>
+                      <a:tailEnd type="none" w="med" len="med"/>
+                    </a:lnB>
+                    <a:lnTlToBr w="12700" cmpd="sng">
+                      <a:noFill/>
+                      <a:prstDash val="solid"/>
+                    </a:lnTlToBr>
+                    <a:lnBlToTr w="12700" cmpd="sng">
+                      <a:noFill/>
+                      <a:prstDash val="solid"/>
+                    </a:lnBlToTr>
+                  </a:tcPr>
+                </a:tc>
+                <a:tc hMerge="1">
+                  <a:txBody>
+                    <a:bodyPr/>
+                    <a:lstStyle/>
+                    <a:p>
+                      <a:pPr algn="r"/>
+                      <a:endParaRPr lang="en-US" sz="1100" b="0" dirty="0" smtClean="0">
+                        <a:solidFill>
+                          <a:schemeClr val="bg1">
+                            <a:lumMod val="50000"/>
+                          </a:schemeClr>
+                        </a:solidFill>
+                      </a:endParaRPr>
+                    </a:p>
+                  </a:txBody>
+                  <a:tcPr>
+                    <a:lnL w="12700" cap="flat" cmpd="sng" algn="ctr">
+                      <a:noFill/>
                       <a:prstDash val="solid"/>
                       <a:round/>
                       <a:headEnd type="none" w="med" len="med"/>
@@ -3908,33 +4807,33 @@
       </p:graphicFrame>
       <p:graphicFrame>
         <p:nvGraphicFramePr>
-          <p:cNvPr id="8" name="Table 7"/>
+          <p:cNvPr id="4" name="Table 3"/>
           <p:cNvGraphicFramePr>
             <a:graphicFrameLocks noGrp="1"/>
           </p:cNvGraphicFramePr>
           <p:nvPr>
             <p:extLst>
               <p:ext uri="{D42A27DB-BD31-4B8C-83A1-F6EECF244321}">
-                <p14:modId xmlns:p14="http://schemas.microsoft.com/office/powerpoint/2010/main" val="1424409822"/>
+                <p14:modId xmlns:p14="http://schemas.microsoft.com/office/powerpoint/2010/main" val="2561975201"/>
               </p:ext>
             </p:extLst>
           </p:nvPr>
         </p:nvGraphicFramePr>
         <p:xfrm>
-          <a:off x="4145280" y="1447800"/>
-          <a:ext cx="2476500" cy="888478"/>
+          <a:off x="5934075" y="247631"/>
+          <a:ext cx="2989415" cy="1111216"/>
         </p:xfrm>
         <a:graphic>
           <a:graphicData uri="http://schemas.openxmlformats.org/drawingml/2006/table">
             <a:tbl>
-              <a:tblPr bandRow="1">
-                <a:tableStyleId>{3C2FFA5D-87B4-456A-9821-1D502468CF0F}</a:tableStyleId>
+              <a:tblPr firstRow="1" bandRow="1">
+                <a:tableStyleId>{5C22544A-7EE6-4342-B048-85BDC9FD1C3A}</a:tableStyleId>
               </a:tblPr>
               <a:tblGrid>
-                <a:gridCol w="1217468"/>
-                <a:gridCol w="1259032"/>
+                <a:gridCol w="909493"/>
+                <a:gridCol w="2079922"/>
               </a:tblGrid>
-              <a:tr h="276599">
+              <a:tr h="386126">
                 <a:tc gridSpan="2">
                   <a:txBody>
                     <a:bodyPr/>
@@ -3942,7 +4841,7 @@
                     <a:p>
                       <a:pPr algn="ctr"/>
                       <a:r>
-                        <a:rPr lang="en-US" sz="1600" b="1" dirty="0" smtClean="0">
+                        <a:rPr lang="en-US" sz="1600" dirty="0" smtClean="0">
                           <a:solidFill>
                             <a:schemeClr val="bg1"/>
                           </a:solidFill>
@@ -3984,23 +4883,10 @@
                       <a:headEnd type="none" w="med" len="med"/>
                       <a:tailEnd type="none" w="med" len="med"/>
                     </a:lnT>
-                    <a:lnB w="12700" cap="flat" cmpd="sng" algn="ctr">
-                      <a:noFill/>
-                      <a:prstDash val="solid"/>
-                      <a:round/>
-                      <a:headEnd type="none" w="med" len="med"/>
-                      <a:tailEnd type="none" w="med" len="med"/>
-                    </a:lnB>
-                    <a:lnTlToBr w="12700" cmpd="sng">
-                      <a:noFill/>
-                      <a:prstDash val="solid"/>
-                    </a:lnTlToBr>
-                    <a:lnBlToTr w="12700" cmpd="sng">
-                      <a:noFill/>
-                      <a:prstDash val="solid"/>
-                    </a:lnBlToTr>
                     <a:solidFill>
-                      <a:schemeClr val="tx2"/>
+                      <a:schemeClr val="accent1">
+                        <a:lumMod val="75000"/>
+                      </a:schemeClr>
                     </a:solidFill>
                   </a:tcPr>
                 </a:tc>
@@ -4046,17 +4932,17 @@
                   </a:tcPr>
                 </a:tc>
               </a:tr>
-              <a:tr h="276599">
+              <a:tr h="349458">
                 <a:tc>
                   <a:txBody>
                     <a:bodyPr/>
                     <a:lstStyle/>
                     <a:p>
                       <a:r>
-                        <a:rPr lang="en-US" sz="1200" b="0" dirty="0" smtClean="0"/>
-                        <a:t>id</a:t>
+                        <a:rPr lang="en-US" sz="1100" dirty="0" smtClean="0"/>
+                        <a:t>ID</a:t>
                       </a:r>
-                      <a:endParaRPr lang="en-US" sz="1200" b="0" dirty="0"/>
+                      <a:endParaRPr lang="en-US" sz="1100" b="0" dirty="0"/>
                     </a:p>
                   </a:txBody>
                   <a:tcPr>
@@ -4078,138 +4964,6 @@
                       <a:headEnd type="none" w="med" len="med"/>
                       <a:tailEnd type="none" w="med" len="med"/>
                     </a:lnR>
-                    <a:lnT w="12700" cap="flat" cmpd="sng" algn="ctr">
-                      <a:noFill/>
-                      <a:prstDash val="solid"/>
-                      <a:round/>
-                      <a:headEnd type="none" w="med" len="med"/>
-                      <a:tailEnd type="none" w="med" len="med"/>
-                    </a:lnT>
-                    <a:lnB w="12700" cap="flat" cmpd="sng" algn="ctr">
-                      <a:noFill/>
-                      <a:prstDash val="solid"/>
-                      <a:round/>
-                      <a:headEnd type="none" w="med" len="med"/>
-                      <a:tailEnd type="none" w="med" len="med"/>
-                    </a:lnB>
-                    <a:lnTlToBr w="12700" cmpd="sng">
-                      <a:noFill/>
-                      <a:prstDash val="solid"/>
-                    </a:lnTlToBr>
-                    <a:lnBlToTr w="12700" cmpd="sng">
-                      <a:noFill/>
-                      <a:prstDash val="solid"/>
-                    </a:lnBlToTr>
-                  </a:tcPr>
-                </a:tc>
-                <a:tc>
-                  <a:txBody>
-                    <a:bodyPr/>
-                    <a:lstStyle/>
-                    <a:p>
-                      <a:endParaRPr lang="en-US" sz="1200" dirty="0"/>
-                    </a:p>
-                  </a:txBody>
-                  <a:tcPr>
-                    <a:lnL w="12700" cap="flat" cmpd="sng" algn="ctr">
-                      <a:solidFill>
-                        <a:schemeClr val="tx1"/>
-                      </a:solidFill>
-                      <a:prstDash val="solid"/>
-                      <a:round/>
-                      <a:headEnd type="none" w="med" len="med"/>
-                      <a:tailEnd type="none" w="med" len="med"/>
-                    </a:lnL>
-                    <a:lnR w="12700" cap="flat" cmpd="sng" algn="ctr">
-                      <a:solidFill>
-                        <a:schemeClr val="tx1"/>
-                      </a:solidFill>
-                      <a:prstDash val="solid"/>
-                      <a:round/>
-                      <a:headEnd type="none" w="med" len="med"/>
-                      <a:tailEnd type="none" w="med" len="med"/>
-                    </a:lnR>
-                    <a:lnT w="12700" cap="flat" cmpd="sng" algn="ctr">
-                      <a:noFill/>
-                      <a:prstDash val="solid"/>
-                      <a:round/>
-                      <a:headEnd type="none" w="med" len="med"/>
-                      <a:tailEnd type="none" w="med" len="med"/>
-                    </a:lnT>
-                    <a:lnB w="12700" cap="flat" cmpd="sng" algn="ctr">
-                      <a:noFill/>
-                      <a:prstDash val="solid"/>
-                      <a:round/>
-                      <a:headEnd type="none" w="med" len="med"/>
-                      <a:tailEnd type="none" w="med" len="med"/>
-                    </a:lnB>
-                    <a:lnTlToBr w="12700" cmpd="sng">
-                      <a:noFill/>
-                      <a:prstDash val="solid"/>
-                    </a:lnTlToBr>
-                    <a:lnBlToTr w="12700" cmpd="sng">
-                      <a:noFill/>
-                      <a:prstDash val="solid"/>
-                    </a:lnBlToTr>
-                  </a:tcPr>
-                </a:tc>
-              </a:tr>
-              <a:tr h="276599">
-                <a:tc>
-                  <a:txBody>
-                    <a:bodyPr/>
-                    <a:lstStyle/>
-                    <a:p>
-                      <a:r>
-                        <a:rPr lang="en-US" sz="1200" b="0" dirty="0" smtClean="0"/>
-                        <a:t>Title</a:t>
-                      </a:r>
-                      <a:endParaRPr lang="en-US" sz="1200" b="0" dirty="0"/>
-                    </a:p>
-                  </a:txBody>
-                  <a:tcPr>
-                    <a:lnL w="12700" cap="flat" cmpd="sng" algn="ctr">
-                      <a:solidFill>
-                        <a:schemeClr val="tx1"/>
-                      </a:solidFill>
-                      <a:prstDash val="solid"/>
-                      <a:round/>
-                      <a:headEnd type="none" w="med" len="med"/>
-                      <a:tailEnd type="none" w="med" len="med"/>
-                    </a:lnL>
-                    <a:lnR w="12700" cap="flat" cmpd="sng" algn="ctr">
-                      <a:solidFill>
-                        <a:schemeClr val="tx1"/>
-                      </a:solidFill>
-                      <a:prstDash val="solid"/>
-                      <a:round/>
-                      <a:headEnd type="none" w="med" len="med"/>
-                      <a:tailEnd type="none" w="med" len="med"/>
-                    </a:lnR>
-                    <a:lnT w="12700" cap="flat" cmpd="sng" algn="ctr">
-                      <a:noFill/>
-                      <a:prstDash val="solid"/>
-                      <a:round/>
-                      <a:headEnd type="none" w="med" len="med"/>
-                      <a:tailEnd type="none" w="med" len="med"/>
-                    </a:lnT>
-                    <a:lnB w="12700" cap="flat" cmpd="sng" algn="ctr">
-                      <a:solidFill>
-                        <a:schemeClr val="tx1"/>
-                      </a:solidFill>
-                      <a:prstDash val="solid"/>
-                      <a:round/>
-                      <a:headEnd type="none" w="med" len="med"/>
-                      <a:tailEnd type="none" w="med" len="med"/>
-                    </a:lnB>
-                    <a:lnTlToBr w="12700" cmpd="sng">
-                      <a:noFill/>
-                      <a:prstDash val="solid"/>
-                    </a:lnTlToBr>
-                    <a:lnBlToTr w="12700" cmpd="sng">
-                      <a:noFill/>
-                      <a:prstDash val="solid"/>
-                    </a:lnBlToTr>
                   </a:tcPr>
                 </a:tc>
                 <a:tc>
@@ -4218,10 +4972,94 @@
                     <a:lstStyle/>
                     <a:p>
                       <a:r>
-                        <a:rPr lang="en-US" sz="1200" dirty="0" smtClean="0"/>
-                        <a:t>C2 Traffic</a:t>
+                        <a:rPr lang="en-US" sz="1100" dirty="0" smtClean="0"/>
+                        <a:t>example:Indicator-33fe3b22-0201-47cf-85d0-97c02164528d</a:t>
                       </a:r>
-                      <a:endParaRPr lang="en-US" sz="1200" b="0" dirty="0" smtClean="0"/>
+                      <a:endParaRPr lang="en-US" sz="1100" dirty="0" smtClean="0"/>
+                    </a:p>
+                  </a:txBody>
+                  <a:tcPr>
+                    <a:lnL w="12700" cap="flat" cmpd="sng" algn="ctr">
+                      <a:solidFill>
+                        <a:schemeClr val="tx1"/>
+                      </a:solidFill>
+                      <a:prstDash val="solid"/>
+                      <a:round/>
+                      <a:headEnd type="none" w="med" len="med"/>
+                      <a:tailEnd type="none" w="med" len="med"/>
+                    </a:lnL>
+                    <a:lnR w="12700" cap="flat" cmpd="sng" algn="ctr">
+                      <a:solidFill>
+                        <a:schemeClr val="tx1"/>
+                      </a:solidFill>
+                      <a:prstDash val="solid"/>
+                      <a:round/>
+                      <a:headEnd type="none" w="med" len="med"/>
+                      <a:tailEnd type="none" w="med" len="med"/>
+                    </a:lnR>
+                    <a:lnB w="12700" cap="flat" cmpd="sng" algn="ctr">
+                      <a:noFill/>
+                      <a:prstDash val="solid"/>
+                      <a:round/>
+                      <a:headEnd type="none" w="med" len="med"/>
+                      <a:tailEnd type="none" w="med" len="med"/>
+                    </a:lnB>
+                  </a:tcPr>
+                </a:tc>
+              </a:tr>
+              <a:tr h="298370">
+                <a:tc>
+                  <a:txBody>
+                    <a:bodyPr/>
+                    <a:lstStyle/>
+                    <a:p>
+                      <a:r>
+                        <a:rPr lang="en-US" sz="1100" dirty="0" smtClean="0"/>
+                        <a:t>Title</a:t>
+                      </a:r>
+                      <a:endParaRPr lang="en-US" sz="1100" b="0" dirty="0"/>
+                    </a:p>
+                  </a:txBody>
+                  <a:tcPr>
+                    <a:lnL w="12700" cap="flat" cmpd="sng" algn="ctr">
+                      <a:solidFill>
+                        <a:schemeClr val="tx1"/>
+                      </a:solidFill>
+                      <a:prstDash val="solid"/>
+                      <a:round/>
+                      <a:headEnd type="none" w="med" len="med"/>
+                      <a:tailEnd type="none" w="med" len="med"/>
+                    </a:lnL>
+                    <a:lnR w="12700" cap="flat" cmpd="sng" algn="ctr">
+                      <a:solidFill>
+                        <a:schemeClr val="tx1"/>
+                      </a:solidFill>
+                      <a:prstDash val="solid"/>
+                      <a:round/>
+                      <a:headEnd type="none" w="med" len="med"/>
+                      <a:tailEnd type="none" w="med" len="med"/>
+                    </a:lnR>
+                    <a:lnB w="12700" cap="flat" cmpd="sng" algn="ctr">
+                      <a:solidFill>
+                        <a:schemeClr val="tx1"/>
+                      </a:solidFill>
+                      <a:prstDash val="solid"/>
+                      <a:round/>
+                      <a:headEnd type="none" w="med" len="med"/>
+                      <a:tailEnd type="none" w="med" len="med"/>
+                    </a:lnB>
+                  </a:tcPr>
+                </a:tc>
+                <a:tc>
+                  <a:txBody>
+                    <a:bodyPr/>
+                    <a:lstStyle/>
+                    <a:p>
+                      <a:r>
+                        <a:rPr lang="en-US" sz="1100" dirty="0" smtClean="0"/>
+                        <a:t>C2 Behavior</a:t>
+                      </a:r>
+                      <a:endParaRPr lang="en-US" sz="1100" dirty="0" smtClean="0"/>
                     </a:p>
                   </a:txBody>
                   <a:tcPr>
@@ -4276,25 +5114,95 @@
       </p:graphicFrame>
       <p:cxnSp>
         <p:nvCxnSpPr>
-          <p:cNvPr id="15" name="Straight Arrow Connector 14"/>
+          <p:cNvPr id="5" name="Straight Connector 4"/>
+          <p:cNvCxnSpPr/>
+          <p:nvPr/>
+        </p:nvCxnSpPr>
+        <p:spPr>
+          <a:xfrm>
+            <a:off x="5076825" y="3562350"/>
+            <a:ext cx="704850" cy="0"/>
+          </a:xfrm>
+          <a:prstGeom prst="line">
+            <a:avLst/>
+          </a:prstGeom>
+          <a:ln w="25400">
+            <a:solidFill>
+              <a:srgbClr val="FF0000"/>
+            </a:solidFill>
+            <a:tailEnd type="none"/>
+          </a:ln>
+        </p:spPr>
+        <p:style>
+          <a:lnRef idx="1">
+            <a:schemeClr val="accent1"/>
+          </a:lnRef>
+          <a:fillRef idx="0">
+            <a:schemeClr val="accent1"/>
+          </a:fillRef>
+          <a:effectRef idx="0">
+            <a:schemeClr val="accent1"/>
+          </a:effectRef>
+          <a:fontRef idx="minor">
+            <a:schemeClr val="tx1"/>
+          </a:fontRef>
+        </p:style>
+      </p:cxnSp>
+      <p:cxnSp>
+        <p:nvCxnSpPr>
+          <p:cNvPr id="7" name="Straight Connector 6"/>
           <p:cNvCxnSpPr/>
           <p:nvPr/>
         </p:nvCxnSpPr>
         <p:spPr>
           <a:xfrm flipV="1">
-            <a:off x="1756229" y="1935480"/>
-            <a:ext cx="2457631" cy="1386840"/>
+            <a:off x="5781675" y="781050"/>
+            <a:ext cx="0" cy="2781300"/>
           </a:xfrm>
-          <a:prstGeom prst="bentConnector3">
-            <a:avLst>
-              <a:gd name="adj1" fmla="val 84726"/>
-            </a:avLst>
+          <a:prstGeom prst="line">
+            <a:avLst/>
           </a:prstGeom>
           <a:ln w="25400">
             <a:solidFill>
               <a:srgbClr val="FF0000"/>
             </a:solidFill>
-            <a:tailEnd type="arrow"/>
+            <a:tailEnd type="none"/>
+          </a:ln>
+        </p:spPr>
+        <p:style>
+          <a:lnRef idx="1">
+            <a:schemeClr val="accent1"/>
+          </a:lnRef>
+          <a:fillRef idx="0">
+            <a:schemeClr val="accent1"/>
+          </a:fillRef>
+          <a:effectRef idx="0">
+            <a:schemeClr val="accent1"/>
+          </a:effectRef>
+          <a:fontRef idx="minor">
+            <a:schemeClr val="tx1"/>
+          </a:fontRef>
+        </p:style>
+      </p:cxnSp>
+      <p:cxnSp>
+        <p:nvCxnSpPr>
+          <p:cNvPr id="10" name="Straight Connector 9"/>
+          <p:cNvCxnSpPr/>
+          <p:nvPr/>
+        </p:nvCxnSpPr>
+        <p:spPr>
+          <a:xfrm>
+            <a:off x="5781675" y="781050"/>
+            <a:ext cx="228600" cy="0"/>
+          </a:xfrm>
+          <a:prstGeom prst="line">
+            <a:avLst/>
+          </a:prstGeom>
+          <a:ln w="25400">
+            <a:solidFill>
+              <a:srgbClr val="FF0000"/>
+            </a:solidFill>
+            <a:tailEnd type="triangle"/>
           </a:ln>
         </p:spPr>
         <p:style>
@@ -4612,7 +5520,7 @@
           <a:solidFill>
             <a:srgbClr val="FF0000"/>
           </a:solidFill>
-          <a:tailEnd type="arrow"/>
+          <a:tailEnd type="none"/>
         </a:ln>
       </a:spPr>
       <a:bodyPr/>

</xml_diff>